<commit_message>
feat: GUI: show "simulate model" in entity list
</commit_message>
<xml_diff>
--- a/doc/devdoc/Konzept Doku.pptx
+++ b/doc/devdoc/Konzept Doku.pptx
@@ -8,17 +8,18 @@
     <p:sldId id="256" r:id="rId2"/>
     <p:sldId id="257" r:id="rId3"/>
     <p:sldId id="261" r:id="rId4"/>
-    <p:sldId id="260" r:id="rId5"/>
+    <p:sldId id="262" r:id="rId5"/>
+    <p:sldId id="260" r:id="rId6"/>
   </p:sldIdLst>
   <p:sldSz cx="12192000" cy="6858000"/>
   <p:notesSz cx="6858000" cy="9144000"/>
   <p:embeddedFontLst>
     <p:embeddedFont>
       <p:font typeface="Open Sans" panose="020B0604020202020204" charset="0"/>
-      <p:regular r:id="rId6"/>
-      <p:bold r:id="rId7"/>
-      <p:italic r:id="rId8"/>
-      <p:boldItalic r:id="rId9"/>
+      <p:regular r:id="rId7"/>
+      <p:bold r:id="rId8"/>
+      <p:italic r:id="rId9"/>
+      <p:boldItalic r:id="rId10"/>
     </p:embeddedFont>
   </p:embeddedFontLst>
   <p:defaultTextStyle>
@@ -4617,7 +4618,7 @@
         </p:nvSpPr>
         <p:spPr>
           <a:xfrm>
-            <a:off x="9037317" y="1331021"/>
+            <a:off x="9095506" y="1384809"/>
             <a:ext cx="2590799" cy="540327"/>
           </a:xfrm>
           <a:prstGeom prst="roundRect">
@@ -4893,7 +4894,7 @@
         </p:nvSpPr>
         <p:spPr>
           <a:xfrm>
-            <a:off x="5788426" y="201250"/>
+            <a:off x="10094419" y="269328"/>
             <a:ext cx="1313410" cy="523702"/>
           </a:xfrm>
           <a:prstGeom prst="roundRect">
@@ -5293,7 +5294,7 @@
         </p:nvSpPr>
         <p:spPr>
           <a:xfrm>
-            <a:off x="7905401" y="201250"/>
+            <a:off x="5788426" y="269328"/>
             <a:ext cx="1784465" cy="523702"/>
           </a:xfrm>
           <a:prstGeom prst="roundRect">
@@ -5407,7 +5408,7 @@
         </p:nvSpPr>
         <p:spPr>
           <a:xfrm>
-            <a:off x="3795817" y="201250"/>
+            <a:off x="8135061" y="269328"/>
             <a:ext cx="1784465" cy="523702"/>
           </a:xfrm>
           <a:prstGeom prst="roundRect">
@@ -5458,7 +5459,7 @@
         </p:nvSpPr>
         <p:spPr>
           <a:xfrm>
-            <a:off x="2212078" y="201250"/>
+            <a:off x="1897305" y="269328"/>
             <a:ext cx="1313410" cy="523702"/>
           </a:xfrm>
           <a:prstGeom prst="roundRect">
@@ -5590,6 +5591,61 @@
               <a:t> fixes</a:t>
             </a:r>
             <a:endParaRPr lang="de-DE" dirty="0"/>
+          </a:p>
+        </p:txBody>
+      </p:sp>
+      <p:sp>
+        <p:nvSpPr>
+          <p:cNvPr id="29" name="Abgerundetes Rechteck 28"/>
+          <p:cNvSpPr/>
+          <p:nvPr/>
+        </p:nvSpPr>
+        <p:spPr>
+          <a:xfrm>
+            <a:off x="9440483" y="4856530"/>
+            <a:ext cx="1784465" cy="523702"/>
+          </a:xfrm>
+          <a:prstGeom prst="roundRect">
+            <a:avLst/>
+          </a:prstGeom>
+          <a:solidFill>
+            <a:schemeClr val="accent5"/>
+          </a:solidFill>
+        </p:spPr>
+        <p:style>
+          <a:lnRef idx="2">
+            <a:schemeClr val="accent1">
+              <a:shade val="50000"/>
+            </a:schemeClr>
+          </a:lnRef>
+          <a:fillRef idx="1">
+            <a:schemeClr val="accent1"/>
+          </a:fillRef>
+          <a:effectRef idx="0">
+            <a:schemeClr val="accent1"/>
+          </a:effectRef>
+          <a:fontRef idx="minor">
+            <a:schemeClr val="lt1"/>
+          </a:fontRef>
+        </p:style>
+        <p:txBody>
+          <a:bodyPr rtlCol="0" anchor="ctr"/>
+          <a:lstStyle/>
+          <a:p>
+            <a:pPr algn="ctr"/>
+            <a:r>
+              <a:rPr lang="de-DE" dirty="0" err="1" smtClean="0"/>
+              <a:t>Deployment</a:t>
+            </a:r>
+            <a:r>
+              <a:rPr lang="de-DE" dirty="0" smtClean="0"/>
+              <a:t> </a:t>
+            </a:r>
+            <a:r>
+              <a:rPr lang="de-DE" dirty="0" err="1" smtClean="0"/>
+              <a:t>docu</a:t>
+            </a:r>
+            <a:endParaRPr lang="de-DE" dirty="0" smtClean="0"/>
           </a:p>
         </p:txBody>
       </p:sp>
@@ -5632,6 +5688,1629 @@
       </p:grpSpPr>
       <p:sp>
         <p:nvSpPr>
+          <p:cNvPr id="13" name="Rechteck 12"/>
+          <p:cNvSpPr/>
+          <p:nvPr/>
+        </p:nvSpPr>
+        <p:spPr>
+          <a:xfrm>
+            <a:off x="469266" y="4831704"/>
+            <a:ext cx="1160520" cy="731520"/>
+          </a:xfrm>
+          <a:prstGeom prst="rect">
+            <a:avLst/>
+          </a:prstGeom>
+          <a:solidFill>
+            <a:schemeClr val="accent5"/>
+          </a:solidFill>
+        </p:spPr>
+        <p:style>
+          <a:lnRef idx="2">
+            <a:schemeClr val="accent1">
+              <a:shade val="50000"/>
+            </a:schemeClr>
+          </a:lnRef>
+          <a:fillRef idx="1">
+            <a:schemeClr val="accent1"/>
+          </a:fillRef>
+          <a:effectRef idx="0">
+            <a:schemeClr val="accent1"/>
+          </a:effectRef>
+          <a:fontRef idx="minor">
+            <a:schemeClr val="lt1"/>
+          </a:fontRef>
+        </p:style>
+        <p:txBody>
+          <a:bodyPr rtlCol="0" anchor="ctr"/>
+          <a:lstStyle/>
+          <a:p>
+            <a:pPr algn="ctr"/>
+            <a:r>
+              <a:rPr lang="de-DE" dirty="0" err="1" smtClean="0">
+                <a:solidFill>
+                  <a:schemeClr val="bg1"/>
+                </a:solidFill>
+              </a:rPr>
+              <a:t>DevDoc</a:t>
+            </a:r>
+            <a:endParaRPr lang="de-DE" dirty="0">
+              <a:solidFill>
+                <a:schemeClr val="bg1"/>
+              </a:solidFill>
+            </a:endParaRPr>
+          </a:p>
+        </p:txBody>
+      </p:sp>
+      <p:sp>
+        <p:nvSpPr>
+          <p:cNvPr id="15" name="Rechteck 14"/>
+          <p:cNvSpPr/>
+          <p:nvPr/>
+        </p:nvSpPr>
+        <p:spPr>
+          <a:xfrm>
+            <a:off x="504843" y="2906930"/>
+            <a:ext cx="1160520" cy="731520"/>
+          </a:xfrm>
+          <a:prstGeom prst="rect">
+            <a:avLst/>
+          </a:prstGeom>
+          <a:solidFill>
+            <a:schemeClr val="accent5"/>
+          </a:solidFill>
+        </p:spPr>
+        <p:style>
+          <a:lnRef idx="2">
+            <a:schemeClr val="accent1">
+              <a:shade val="50000"/>
+            </a:schemeClr>
+          </a:lnRef>
+          <a:fillRef idx="1">
+            <a:schemeClr val="accent1"/>
+          </a:fillRef>
+          <a:effectRef idx="0">
+            <a:schemeClr val="accent1"/>
+          </a:effectRef>
+          <a:fontRef idx="minor">
+            <a:schemeClr val="lt1"/>
+          </a:fontRef>
+        </p:style>
+        <p:txBody>
+          <a:bodyPr rtlCol="0" anchor="ctr"/>
+          <a:lstStyle/>
+          <a:p>
+            <a:pPr algn="ctr"/>
+            <a:r>
+              <a:rPr lang="de-DE" dirty="0" err="1" smtClean="0">
+                <a:solidFill>
+                  <a:schemeClr val="bg1"/>
+                </a:solidFill>
+              </a:rPr>
+              <a:t>UserDoc</a:t>
+            </a:r>
+            <a:endParaRPr lang="de-DE" dirty="0">
+              <a:solidFill>
+                <a:schemeClr val="bg1"/>
+              </a:solidFill>
+            </a:endParaRPr>
+          </a:p>
+        </p:txBody>
+      </p:sp>
+      <p:sp>
+        <p:nvSpPr>
+          <p:cNvPr id="17" name="Abgerundetes Rechteck 16"/>
+          <p:cNvSpPr/>
+          <p:nvPr/>
+        </p:nvSpPr>
+        <p:spPr>
+          <a:xfrm>
+            <a:off x="2000144" y="2892149"/>
+            <a:ext cx="1313410" cy="523702"/>
+          </a:xfrm>
+          <a:prstGeom prst="roundRect">
+            <a:avLst/>
+          </a:prstGeom>
+          <a:solidFill>
+            <a:srgbClr val="00B050"/>
+          </a:solidFill>
+        </p:spPr>
+        <p:style>
+          <a:lnRef idx="2">
+            <a:schemeClr val="accent1">
+              <a:shade val="50000"/>
+            </a:schemeClr>
+          </a:lnRef>
+          <a:fillRef idx="1">
+            <a:schemeClr val="accent1"/>
+          </a:fillRef>
+          <a:effectRef idx="0">
+            <a:schemeClr val="accent1"/>
+          </a:effectRef>
+          <a:fontRef idx="minor">
+            <a:schemeClr val="lt1"/>
+          </a:fontRef>
+        </p:style>
+        <p:txBody>
+          <a:bodyPr rtlCol="0" anchor="ctr"/>
+          <a:lstStyle/>
+          <a:p>
+            <a:pPr algn="ctr"/>
+            <a:r>
+              <a:rPr lang="de-DE" dirty="0" smtClean="0"/>
+              <a:t>Installation</a:t>
+            </a:r>
+            <a:endParaRPr lang="de-DE" dirty="0"/>
+          </a:p>
+        </p:txBody>
+      </p:sp>
+      <p:sp>
+        <p:nvSpPr>
+          <p:cNvPr id="18" name="Abgerundetes Rechteck 17"/>
+          <p:cNvSpPr/>
+          <p:nvPr/>
+        </p:nvSpPr>
+        <p:spPr>
+          <a:xfrm>
+            <a:off x="2189909" y="1034501"/>
+            <a:ext cx="1784465" cy="523702"/>
+          </a:xfrm>
+          <a:prstGeom prst="roundRect">
+            <a:avLst/>
+          </a:prstGeom>
+          <a:solidFill>
+            <a:srgbClr val="00B050"/>
+          </a:solidFill>
+        </p:spPr>
+        <p:style>
+          <a:lnRef idx="2">
+            <a:schemeClr val="accent1">
+              <a:shade val="50000"/>
+            </a:schemeClr>
+          </a:lnRef>
+          <a:fillRef idx="1">
+            <a:schemeClr val="accent1"/>
+          </a:fillRef>
+          <a:effectRef idx="0">
+            <a:schemeClr val="accent1"/>
+          </a:effectRef>
+          <a:fontRef idx="minor">
+            <a:schemeClr val="lt1"/>
+          </a:fontRef>
+        </p:style>
+        <p:txBody>
+          <a:bodyPr rtlCol="0" anchor="ctr"/>
+          <a:lstStyle/>
+          <a:p>
+            <a:pPr algn="ctr"/>
+            <a:r>
+              <a:rPr lang="de-DE" dirty="0" smtClean="0"/>
+              <a:t>Entity </a:t>
+            </a:r>
+            <a:r>
+              <a:rPr lang="de-DE" dirty="0" err="1" smtClean="0"/>
+              <a:t>Types</a:t>
+            </a:r>
+            <a:endParaRPr lang="de-DE" dirty="0"/>
+          </a:p>
+        </p:txBody>
+      </p:sp>
+      <p:sp>
+        <p:nvSpPr>
+          <p:cNvPr id="19" name="Abgerundetes Rechteck 18"/>
+          <p:cNvSpPr/>
+          <p:nvPr/>
+        </p:nvSpPr>
+        <p:spPr>
+          <a:xfrm>
+            <a:off x="5671970" y="2826827"/>
+            <a:ext cx="1784465" cy="523702"/>
+          </a:xfrm>
+          <a:prstGeom prst="roundRect">
+            <a:avLst/>
+          </a:prstGeom>
+          <a:solidFill>
+            <a:srgbClr val="00B050"/>
+          </a:solidFill>
+        </p:spPr>
+        <p:style>
+          <a:lnRef idx="2">
+            <a:schemeClr val="accent1">
+              <a:shade val="50000"/>
+            </a:schemeClr>
+          </a:lnRef>
+          <a:fillRef idx="1">
+            <a:schemeClr val="accent1"/>
+          </a:fillRef>
+          <a:effectRef idx="0">
+            <a:schemeClr val="accent1"/>
+          </a:effectRef>
+          <a:fontRef idx="minor">
+            <a:schemeClr val="lt1"/>
+          </a:fontRef>
+        </p:style>
+        <p:txBody>
+          <a:bodyPr rtlCol="0" anchor="ctr"/>
+          <a:lstStyle/>
+          <a:p>
+            <a:pPr algn="ctr"/>
+            <a:r>
+              <a:rPr lang="de-DE" dirty="0" err="1" smtClean="0"/>
+              <a:t>Data_repo</a:t>
+            </a:r>
+            <a:r>
+              <a:rPr lang="de-DE" dirty="0" smtClean="0"/>
+              <a:t> </a:t>
+            </a:r>
+            <a:r>
+              <a:rPr lang="de-DE" dirty="0" err="1" smtClean="0"/>
+              <a:t>Structure</a:t>
+            </a:r>
+            <a:endParaRPr lang="de-DE" dirty="0"/>
+          </a:p>
+        </p:txBody>
+      </p:sp>
+      <p:sp>
+        <p:nvSpPr>
+          <p:cNvPr id="20" name="Abgerundetes Rechteck 19"/>
+          <p:cNvSpPr/>
+          <p:nvPr/>
+        </p:nvSpPr>
+        <p:spPr>
+          <a:xfrm>
+            <a:off x="2104167" y="4700238"/>
+            <a:ext cx="1955948" cy="531562"/>
+          </a:xfrm>
+          <a:prstGeom prst="roundRect">
+            <a:avLst/>
+          </a:prstGeom>
+          <a:solidFill>
+            <a:schemeClr val="accent5"/>
+          </a:solidFill>
+        </p:spPr>
+        <p:style>
+          <a:lnRef idx="2">
+            <a:schemeClr val="accent1">
+              <a:shade val="50000"/>
+            </a:schemeClr>
+          </a:lnRef>
+          <a:fillRef idx="1">
+            <a:schemeClr val="accent1"/>
+          </a:fillRef>
+          <a:effectRef idx="0">
+            <a:schemeClr val="accent1"/>
+          </a:effectRef>
+          <a:fontRef idx="minor">
+            <a:schemeClr val="lt1"/>
+          </a:fontRef>
+        </p:style>
+        <p:txBody>
+          <a:bodyPr rtlCol="0" anchor="ctr"/>
+          <a:lstStyle/>
+          <a:p>
+            <a:pPr algn="ctr"/>
+            <a:r>
+              <a:rPr lang="de-DE" dirty="0" err="1" smtClean="0"/>
+              <a:t>Contributing</a:t>
+            </a:r>
+            <a:r>
+              <a:rPr lang="de-DE" dirty="0" smtClean="0"/>
+              <a:t> </a:t>
+            </a:r>
+            <a:r>
+              <a:rPr lang="de-DE" dirty="0" err="1" smtClean="0"/>
+              <a:t>data</a:t>
+            </a:r>
+            <a:endParaRPr lang="de-DE" dirty="0" smtClean="0"/>
+          </a:p>
+        </p:txBody>
+      </p:sp>
+      <p:sp>
+        <p:nvSpPr>
+          <p:cNvPr id="22" name="Abgerundetes Rechteck 21"/>
+          <p:cNvSpPr/>
+          <p:nvPr/>
+        </p:nvSpPr>
+        <p:spPr>
+          <a:xfrm>
+            <a:off x="6316677" y="5329262"/>
+            <a:ext cx="1784465" cy="523702"/>
+          </a:xfrm>
+          <a:prstGeom prst="roundRect">
+            <a:avLst/>
+          </a:prstGeom>
+          <a:solidFill>
+            <a:srgbClr val="00B050"/>
+          </a:solidFill>
+        </p:spPr>
+        <p:style>
+          <a:lnRef idx="2">
+            <a:schemeClr val="accent1">
+              <a:shade val="50000"/>
+            </a:schemeClr>
+          </a:lnRef>
+          <a:fillRef idx="1">
+            <a:schemeClr val="accent1"/>
+          </a:fillRef>
+          <a:effectRef idx="0">
+            <a:schemeClr val="accent1"/>
+          </a:effectRef>
+          <a:fontRef idx="minor">
+            <a:schemeClr val="lt1"/>
+          </a:fontRef>
+        </p:style>
+        <p:txBody>
+          <a:bodyPr rtlCol="0" anchor="ctr"/>
+          <a:lstStyle/>
+          <a:p>
+            <a:pPr algn="ctr"/>
+            <a:r>
+              <a:rPr lang="de-DE" dirty="0" err="1" smtClean="0"/>
+              <a:t>unittests</a:t>
+            </a:r>
+            <a:endParaRPr lang="de-DE" dirty="0"/>
+          </a:p>
+        </p:txBody>
+      </p:sp>
+      <p:sp>
+        <p:nvSpPr>
+          <p:cNvPr id="23" name="Abgerundetes Rechteck 22"/>
+          <p:cNvSpPr/>
+          <p:nvPr/>
+        </p:nvSpPr>
+        <p:spPr>
+          <a:xfrm>
+            <a:off x="8301844" y="5332209"/>
+            <a:ext cx="1784465" cy="523702"/>
+          </a:xfrm>
+          <a:prstGeom prst="roundRect">
+            <a:avLst/>
+          </a:prstGeom>
+          <a:solidFill>
+            <a:srgbClr val="00B050"/>
+          </a:solidFill>
+        </p:spPr>
+        <p:style>
+          <a:lnRef idx="2">
+            <a:schemeClr val="accent1">
+              <a:shade val="50000"/>
+            </a:schemeClr>
+          </a:lnRef>
+          <a:fillRef idx="1">
+            <a:schemeClr val="accent1"/>
+          </a:fillRef>
+          <a:effectRef idx="0">
+            <a:schemeClr val="accent1"/>
+          </a:effectRef>
+          <a:fontRef idx="minor">
+            <a:schemeClr val="lt1"/>
+          </a:fontRef>
+        </p:style>
+        <p:txBody>
+          <a:bodyPr rtlCol="0" anchor="ctr"/>
+          <a:lstStyle/>
+          <a:p>
+            <a:pPr algn="ctr"/>
+            <a:r>
+              <a:rPr lang="de-DE" dirty="0" smtClean="0"/>
+              <a:t>Run </a:t>
+            </a:r>
+            <a:r>
+              <a:rPr lang="de-DE" dirty="0" err="1" smtClean="0"/>
+              <a:t>local</a:t>
+            </a:r>
+            <a:r>
+              <a:rPr lang="de-DE" dirty="0" smtClean="0"/>
+              <a:t> </a:t>
+            </a:r>
+            <a:r>
+              <a:rPr lang="de-DE" dirty="0" err="1" smtClean="0"/>
+              <a:t>server</a:t>
+            </a:r>
+            <a:endParaRPr lang="de-DE" dirty="0"/>
+          </a:p>
+        </p:txBody>
+      </p:sp>
+      <p:sp>
+        <p:nvSpPr>
+          <p:cNvPr id="24" name="Abgerundetes Rechteck 23"/>
+          <p:cNvSpPr/>
+          <p:nvPr/>
+        </p:nvSpPr>
+        <p:spPr>
+          <a:xfrm>
+            <a:off x="3734413" y="2838279"/>
+            <a:ext cx="1784465" cy="523702"/>
+          </a:xfrm>
+          <a:prstGeom prst="roundRect">
+            <a:avLst/>
+          </a:prstGeom>
+          <a:solidFill>
+            <a:srgbClr val="00B050"/>
+          </a:solidFill>
+        </p:spPr>
+        <p:style>
+          <a:lnRef idx="2">
+            <a:schemeClr val="accent1">
+              <a:shade val="50000"/>
+            </a:schemeClr>
+          </a:lnRef>
+          <a:fillRef idx="1">
+            <a:schemeClr val="accent1"/>
+          </a:fillRef>
+          <a:effectRef idx="0">
+            <a:schemeClr val="accent1"/>
+          </a:effectRef>
+          <a:fontRef idx="minor">
+            <a:schemeClr val="lt1"/>
+          </a:fontRef>
+        </p:style>
+        <p:txBody>
+          <a:bodyPr rtlCol="0" anchor="ctr"/>
+          <a:lstStyle/>
+          <a:p>
+            <a:pPr algn="ctr"/>
+            <a:r>
+              <a:rPr lang="de-DE" dirty="0" err="1" smtClean="0"/>
+              <a:t>Terminology</a:t>
+            </a:r>
+            <a:endParaRPr lang="de-DE" dirty="0"/>
+          </a:p>
+        </p:txBody>
+      </p:sp>
+      <p:sp>
+        <p:nvSpPr>
+          <p:cNvPr id="25" name="Abgerundetes Rechteck 24"/>
+          <p:cNvSpPr/>
+          <p:nvPr/>
+        </p:nvSpPr>
+        <p:spPr>
+          <a:xfrm>
+            <a:off x="2189908" y="6449982"/>
+            <a:ext cx="1784465" cy="523702"/>
+          </a:xfrm>
+          <a:prstGeom prst="roundRect">
+            <a:avLst/>
+          </a:prstGeom>
+          <a:solidFill>
+            <a:srgbClr val="FFC000"/>
+          </a:solidFill>
+        </p:spPr>
+        <p:style>
+          <a:lnRef idx="2">
+            <a:schemeClr val="accent1">
+              <a:shade val="50000"/>
+            </a:schemeClr>
+          </a:lnRef>
+          <a:fillRef idx="1">
+            <a:schemeClr val="accent1"/>
+          </a:fillRef>
+          <a:effectRef idx="0">
+            <a:schemeClr val="accent1"/>
+          </a:effectRef>
+          <a:fontRef idx="minor">
+            <a:schemeClr val="lt1"/>
+          </a:fontRef>
+        </p:style>
+        <p:txBody>
+          <a:bodyPr rtlCol="0" anchor="ctr"/>
+          <a:lstStyle/>
+          <a:p>
+            <a:pPr algn="ctr"/>
+            <a:r>
+              <a:rPr lang="de-DE" dirty="0" err="1" smtClean="0"/>
+              <a:t>Known</a:t>
+            </a:r>
+            <a:r>
+              <a:rPr lang="de-DE" dirty="0" smtClean="0"/>
+              <a:t> </a:t>
+            </a:r>
+            <a:r>
+              <a:rPr lang="de-DE" dirty="0" err="1" smtClean="0"/>
+              <a:t>Issues</a:t>
+            </a:r>
+            <a:r>
+              <a:rPr lang="de-DE" dirty="0" smtClean="0"/>
+              <a:t> </a:t>
+            </a:r>
+            <a:r>
+              <a:rPr lang="de-DE" dirty="0" err="1" smtClean="0"/>
+              <a:t>and</a:t>
+            </a:r>
+            <a:r>
+              <a:rPr lang="de-DE" dirty="0" smtClean="0"/>
+              <a:t> fixes</a:t>
+            </a:r>
+            <a:endParaRPr lang="de-DE" dirty="0"/>
+          </a:p>
+        </p:txBody>
+      </p:sp>
+      <p:sp>
+        <p:nvSpPr>
+          <p:cNvPr id="26" name="Abgerundetes Rechteck 25"/>
+          <p:cNvSpPr/>
+          <p:nvPr/>
+        </p:nvSpPr>
+        <p:spPr>
+          <a:xfrm>
+            <a:off x="4276829" y="5305303"/>
+            <a:ext cx="1784465" cy="523702"/>
+          </a:xfrm>
+          <a:prstGeom prst="roundRect">
+            <a:avLst/>
+          </a:prstGeom>
+          <a:solidFill>
+            <a:srgbClr val="00B050"/>
+          </a:solidFill>
+        </p:spPr>
+        <p:style>
+          <a:lnRef idx="2">
+            <a:schemeClr val="accent1">
+              <a:shade val="50000"/>
+            </a:schemeClr>
+          </a:lnRef>
+          <a:fillRef idx="1">
+            <a:schemeClr val="accent1"/>
+          </a:fillRef>
+          <a:effectRef idx="0">
+            <a:schemeClr val="accent1"/>
+          </a:effectRef>
+          <a:fontRef idx="minor">
+            <a:schemeClr val="lt1"/>
+          </a:fontRef>
+        </p:style>
+        <p:txBody>
+          <a:bodyPr rtlCol="0" anchor="ctr"/>
+          <a:lstStyle/>
+          <a:p>
+            <a:pPr algn="ctr"/>
+            <a:r>
+              <a:rPr lang="de-DE" dirty="0" smtClean="0"/>
+              <a:t>Project </a:t>
+            </a:r>
+            <a:r>
+              <a:rPr lang="de-DE" dirty="0" err="1" smtClean="0"/>
+              <a:t>Structure</a:t>
+            </a:r>
+            <a:endParaRPr lang="de-DE" dirty="0"/>
+          </a:p>
+        </p:txBody>
+      </p:sp>
+      <p:sp>
+        <p:nvSpPr>
+          <p:cNvPr id="27" name="Abgerundetes Rechteck 26"/>
+          <p:cNvSpPr/>
+          <p:nvPr/>
+        </p:nvSpPr>
+        <p:spPr>
+          <a:xfrm>
+            <a:off x="293792" y="237980"/>
+            <a:ext cx="1655049" cy="523702"/>
+          </a:xfrm>
+          <a:prstGeom prst="roundRect">
+            <a:avLst>
+              <a:gd name="adj" fmla="val 0"/>
+            </a:avLst>
+          </a:prstGeom>
+          <a:solidFill>
+            <a:schemeClr val="accent5"/>
+          </a:solidFill>
+          <a:ln>
+            <a:solidFill>
+              <a:schemeClr val="accent1"/>
+            </a:solidFill>
+          </a:ln>
+        </p:spPr>
+        <p:style>
+          <a:lnRef idx="2">
+            <a:schemeClr val="accent1">
+              <a:shade val="50000"/>
+            </a:schemeClr>
+          </a:lnRef>
+          <a:fillRef idx="1">
+            <a:schemeClr val="accent1"/>
+          </a:fillRef>
+          <a:effectRef idx="0">
+            <a:schemeClr val="accent1"/>
+          </a:effectRef>
+          <a:fontRef idx="minor">
+            <a:schemeClr val="lt1"/>
+          </a:fontRef>
+        </p:style>
+        <p:txBody>
+          <a:bodyPr rtlCol="0" anchor="ctr"/>
+          <a:lstStyle/>
+          <a:p>
+            <a:pPr algn="ctr"/>
+            <a:r>
+              <a:rPr lang="de-DE" dirty="0" err="1" smtClean="0"/>
+              <a:t>Landing</a:t>
+            </a:r>
+            <a:r>
+              <a:rPr lang="de-DE" dirty="0" smtClean="0"/>
+              <a:t> </a:t>
+            </a:r>
+            <a:r>
+              <a:rPr lang="de-DE" dirty="0" err="1" smtClean="0"/>
+              <a:t>page</a:t>
+            </a:r>
+            <a:endParaRPr lang="de-DE" dirty="0"/>
+          </a:p>
+        </p:txBody>
+      </p:sp>
+      <p:sp>
+        <p:nvSpPr>
+          <p:cNvPr id="28" name="Abgerundetes Rechteck 27"/>
+          <p:cNvSpPr/>
+          <p:nvPr/>
+        </p:nvSpPr>
+        <p:spPr>
+          <a:xfrm>
+            <a:off x="9603971" y="3171629"/>
+            <a:ext cx="1784465" cy="523702"/>
+          </a:xfrm>
+          <a:prstGeom prst="roundRect">
+            <a:avLst/>
+          </a:prstGeom>
+          <a:solidFill>
+            <a:srgbClr val="FFC000"/>
+          </a:solidFill>
+        </p:spPr>
+        <p:style>
+          <a:lnRef idx="2">
+            <a:schemeClr val="accent1">
+              <a:shade val="50000"/>
+            </a:schemeClr>
+          </a:lnRef>
+          <a:fillRef idx="1">
+            <a:schemeClr val="accent1"/>
+          </a:fillRef>
+          <a:effectRef idx="0">
+            <a:schemeClr val="accent1"/>
+          </a:effectRef>
+          <a:fontRef idx="minor">
+            <a:schemeClr val="lt1"/>
+          </a:fontRef>
+        </p:style>
+        <p:txBody>
+          <a:bodyPr rtlCol="0" anchor="ctr"/>
+          <a:lstStyle/>
+          <a:p>
+            <a:pPr algn="ctr"/>
+            <a:r>
+              <a:rPr lang="de-DE" dirty="0" err="1" smtClean="0">
+                <a:solidFill>
+                  <a:schemeClr val="tx1"/>
+                </a:solidFill>
+              </a:rPr>
+              <a:t>Known</a:t>
+            </a:r>
+            <a:r>
+              <a:rPr lang="de-DE" dirty="0" smtClean="0">
+                <a:solidFill>
+                  <a:schemeClr val="tx1"/>
+                </a:solidFill>
+              </a:rPr>
+              <a:t> </a:t>
+            </a:r>
+            <a:r>
+              <a:rPr lang="de-DE" dirty="0" err="1" smtClean="0">
+                <a:solidFill>
+                  <a:schemeClr val="tx1"/>
+                </a:solidFill>
+              </a:rPr>
+              <a:t>Issues</a:t>
+            </a:r>
+            <a:r>
+              <a:rPr lang="de-DE" dirty="0" smtClean="0">
+                <a:solidFill>
+                  <a:schemeClr val="tx1"/>
+                </a:solidFill>
+              </a:rPr>
+              <a:t> </a:t>
+            </a:r>
+            <a:r>
+              <a:rPr lang="de-DE" dirty="0" err="1" smtClean="0">
+                <a:solidFill>
+                  <a:schemeClr val="tx1"/>
+                </a:solidFill>
+              </a:rPr>
+              <a:t>and</a:t>
+            </a:r>
+            <a:r>
+              <a:rPr lang="de-DE" dirty="0" smtClean="0">
+                <a:solidFill>
+                  <a:schemeClr val="tx1"/>
+                </a:solidFill>
+              </a:rPr>
+              <a:t> fixes</a:t>
+            </a:r>
+            <a:endParaRPr lang="de-DE" dirty="0">
+              <a:solidFill>
+                <a:schemeClr val="tx1"/>
+              </a:solidFill>
+            </a:endParaRPr>
+          </a:p>
+        </p:txBody>
+      </p:sp>
+      <p:sp>
+        <p:nvSpPr>
+          <p:cNvPr id="29" name="Abgerundetes Rechteck 28"/>
+          <p:cNvSpPr/>
+          <p:nvPr/>
+        </p:nvSpPr>
+        <p:spPr>
+          <a:xfrm>
+            <a:off x="2189909" y="5902297"/>
+            <a:ext cx="1784465" cy="523702"/>
+          </a:xfrm>
+          <a:prstGeom prst="roundRect">
+            <a:avLst/>
+          </a:prstGeom>
+          <a:solidFill>
+            <a:srgbClr val="00B050"/>
+          </a:solidFill>
+        </p:spPr>
+        <p:style>
+          <a:lnRef idx="2">
+            <a:schemeClr val="accent1">
+              <a:shade val="50000"/>
+            </a:schemeClr>
+          </a:lnRef>
+          <a:fillRef idx="1">
+            <a:schemeClr val="accent1"/>
+          </a:fillRef>
+          <a:effectRef idx="0">
+            <a:schemeClr val="accent1"/>
+          </a:effectRef>
+          <a:fontRef idx="minor">
+            <a:schemeClr val="lt1"/>
+          </a:fontRef>
+        </p:style>
+        <p:txBody>
+          <a:bodyPr rtlCol="0" anchor="ctr"/>
+          <a:lstStyle/>
+          <a:p>
+            <a:pPr algn="ctr"/>
+            <a:r>
+              <a:rPr lang="de-DE" dirty="0" err="1" smtClean="0"/>
+              <a:t>Deployment</a:t>
+            </a:r>
+            <a:r>
+              <a:rPr lang="de-DE" dirty="0" smtClean="0"/>
+              <a:t> </a:t>
+            </a:r>
+            <a:r>
+              <a:rPr lang="de-DE" dirty="0" err="1" smtClean="0"/>
+              <a:t>docu</a:t>
+            </a:r>
+            <a:endParaRPr lang="de-DE" dirty="0" smtClean="0"/>
+          </a:p>
+        </p:txBody>
+      </p:sp>
+      <p:sp>
+        <p:nvSpPr>
+          <p:cNvPr id="10" name="Abgerundetes Rechteck 9"/>
+          <p:cNvSpPr/>
+          <p:nvPr/>
+        </p:nvSpPr>
+        <p:spPr>
+          <a:xfrm>
+            <a:off x="302471" y="1797450"/>
+            <a:ext cx="1610630" cy="679210"/>
+          </a:xfrm>
+          <a:prstGeom prst="roundRect">
+            <a:avLst>
+              <a:gd name="adj" fmla="val 0"/>
+            </a:avLst>
+          </a:prstGeom>
+          <a:solidFill>
+            <a:schemeClr val="accent5"/>
+          </a:solidFill>
+        </p:spPr>
+        <p:style>
+          <a:lnRef idx="2">
+            <a:schemeClr val="accent1">
+              <a:shade val="50000"/>
+            </a:schemeClr>
+          </a:lnRef>
+          <a:fillRef idx="1">
+            <a:schemeClr val="accent1"/>
+          </a:fillRef>
+          <a:effectRef idx="0">
+            <a:schemeClr val="accent1"/>
+          </a:effectRef>
+          <a:fontRef idx="minor">
+            <a:schemeClr val="lt1"/>
+          </a:fontRef>
+        </p:style>
+        <p:txBody>
+          <a:bodyPr rtlCol="0" anchor="ctr"/>
+          <a:lstStyle/>
+          <a:p>
+            <a:pPr algn="ctr"/>
+            <a:r>
+              <a:rPr lang="de-DE" dirty="0" smtClean="0"/>
+              <a:t>Web </a:t>
+            </a:r>
+            <a:r>
+              <a:rPr lang="de-DE" dirty="0" err="1" smtClean="0"/>
+              <a:t>oberfläche</a:t>
+            </a:r>
+            <a:endParaRPr lang="de-DE" dirty="0"/>
+          </a:p>
+        </p:txBody>
+      </p:sp>
+      <p:sp>
+        <p:nvSpPr>
+          <p:cNvPr id="12" name="Rechteck 11"/>
+          <p:cNvSpPr/>
+          <p:nvPr/>
+        </p:nvSpPr>
+        <p:spPr>
+          <a:xfrm>
+            <a:off x="302471" y="950547"/>
+            <a:ext cx="1610961" cy="631768"/>
+          </a:xfrm>
+          <a:prstGeom prst="rect">
+            <a:avLst/>
+          </a:prstGeom>
+          <a:solidFill>
+            <a:schemeClr val="accent5"/>
+          </a:solidFill>
+        </p:spPr>
+        <p:style>
+          <a:lnRef idx="2">
+            <a:schemeClr val="accent1">
+              <a:shade val="50000"/>
+            </a:schemeClr>
+          </a:lnRef>
+          <a:fillRef idx="1">
+            <a:schemeClr val="accent1"/>
+          </a:fillRef>
+          <a:effectRef idx="0">
+            <a:schemeClr val="accent1"/>
+          </a:effectRef>
+          <a:fontRef idx="minor">
+            <a:schemeClr val="lt1"/>
+          </a:fontRef>
+        </p:style>
+        <p:txBody>
+          <a:bodyPr rtlCol="0" anchor="ctr"/>
+          <a:lstStyle/>
+          <a:p>
+            <a:pPr algn="ctr"/>
+            <a:r>
+              <a:rPr lang="de-DE" dirty="0" smtClean="0"/>
+              <a:t>General </a:t>
+            </a:r>
+            <a:r>
+              <a:rPr lang="de-DE" dirty="0" err="1" smtClean="0"/>
+              <a:t>Concept</a:t>
+            </a:r>
+            <a:endParaRPr lang="de-DE" dirty="0"/>
+          </a:p>
+        </p:txBody>
+      </p:sp>
+      <p:sp>
+        <p:nvSpPr>
+          <p:cNvPr id="14" name="Rechteck 13"/>
+          <p:cNvSpPr/>
+          <p:nvPr/>
+        </p:nvSpPr>
+        <p:spPr>
+          <a:xfrm>
+            <a:off x="8562492" y="54566"/>
+            <a:ext cx="847517" cy="466986"/>
+          </a:xfrm>
+          <a:prstGeom prst="rect">
+            <a:avLst/>
+          </a:prstGeom>
+          <a:solidFill>
+            <a:srgbClr val="FFC000"/>
+          </a:solidFill>
+        </p:spPr>
+        <p:style>
+          <a:lnRef idx="2">
+            <a:schemeClr val="accent1">
+              <a:shade val="50000"/>
+            </a:schemeClr>
+          </a:lnRef>
+          <a:fillRef idx="1">
+            <a:schemeClr val="accent1"/>
+          </a:fillRef>
+          <a:effectRef idx="0">
+            <a:schemeClr val="accent1"/>
+          </a:effectRef>
+          <a:fontRef idx="minor">
+            <a:schemeClr val="lt1"/>
+          </a:fontRef>
+        </p:style>
+        <p:txBody>
+          <a:bodyPr rtlCol="0" anchor="ctr"/>
+          <a:lstStyle/>
+          <a:p>
+            <a:pPr algn="ctr"/>
+            <a:r>
+              <a:rPr lang="de-DE" dirty="0" err="1" smtClean="0">
+                <a:solidFill>
+                  <a:schemeClr val="tx1"/>
+                </a:solidFill>
+              </a:rPr>
+              <a:t>todo</a:t>
+            </a:r>
+            <a:endParaRPr lang="de-DE" dirty="0">
+              <a:solidFill>
+                <a:schemeClr val="tx1"/>
+              </a:solidFill>
+            </a:endParaRPr>
+          </a:p>
+        </p:txBody>
+      </p:sp>
+      <p:sp>
+        <p:nvSpPr>
+          <p:cNvPr id="30" name="Rechteck 29"/>
+          <p:cNvSpPr/>
+          <p:nvPr/>
+        </p:nvSpPr>
+        <p:spPr>
+          <a:xfrm>
+            <a:off x="9531517" y="54566"/>
+            <a:ext cx="1720735" cy="466986"/>
+          </a:xfrm>
+          <a:prstGeom prst="rect">
+            <a:avLst/>
+          </a:prstGeom>
+          <a:solidFill>
+            <a:schemeClr val="accent5"/>
+          </a:solidFill>
+        </p:spPr>
+        <p:style>
+          <a:lnRef idx="2">
+            <a:schemeClr val="accent1">
+              <a:shade val="50000"/>
+            </a:schemeClr>
+          </a:lnRef>
+          <a:fillRef idx="1">
+            <a:schemeClr val="accent1"/>
+          </a:fillRef>
+          <a:effectRef idx="0">
+            <a:schemeClr val="accent1"/>
+          </a:effectRef>
+          <a:fontRef idx="minor">
+            <a:schemeClr val="lt1"/>
+          </a:fontRef>
+        </p:style>
+        <p:txBody>
+          <a:bodyPr rtlCol="0" anchor="ctr"/>
+          <a:lstStyle/>
+          <a:p>
+            <a:pPr algn="ctr"/>
+            <a:r>
+              <a:rPr lang="de-DE" dirty="0" smtClean="0"/>
+              <a:t>Template </a:t>
+            </a:r>
+            <a:r>
+              <a:rPr lang="de-DE" dirty="0" err="1" smtClean="0"/>
+              <a:t>done</a:t>
+            </a:r>
+            <a:endParaRPr lang="de-DE" dirty="0"/>
+          </a:p>
+        </p:txBody>
+      </p:sp>
+      <p:sp>
+        <p:nvSpPr>
+          <p:cNvPr id="31" name="Rechteck 30"/>
+          <p:cNvSpPr/>
+          <p:nvPr/>
+        </p:nvSpPr>
+        <p:spPr>
+          <a:xfrm>
+            <a:off x="11388436" y="54566"/>
+            <a:ext cx="770890" cy="466986"/>
+          </a:xfrm>
+          <a:prstGeom prst="rect">
+            <a:avLst/>
+          </a:prstGeom>
+          <a:solidFill>
+            <a:srgbClr val="00B050"/>
+          </a:solidFill>
+        </p:spPr>
+        <p:style>
+          <a:lnRef idx="2">
+            <a:schemeClr val="accent1">
+              <a:shade val="50000"/>
+            </a:schemeClr>
+          </a:lnRef>
+          <a:fillRef idx="1">
+            <a:schemeClr val="accent1"/>
+          </a:fillRef>
+          <a:effectRef idx="0">
+            <a:schemeClr val="accent1"/>
+          </a:effectRef>
+          <a:fontRef idx="minor">
+            <a:schemeClr val="lt1"/>
+          </a:fontRef>
+        </p:style>
+        <p:txBody>
+          <a:bodyPr rtlCol="0" anchor="ctr"/>
+          <a:lstStyle/>
+          <a:p>
+            <a:pPr algn="ctr"/>
+            <a:r>
+              <a:rPr lang="de-DE" dirty="0" err="1" smtClean="0"/>
+              <a:t>done</a:t>
+            </a:r>
+            <a:endParaRPr lang="de-DE" dirty="0"/>
+          </a:p>
+        </p:txBody>
+      </p:sp>
+      <p:sp>
+        <p:nvSpPr>
+          <p:cNvPr id="32" name="Abgerundetes Rechteck 31"/>
+          <p:cNvSpPr/>
+          <p:nvPr/>
+        </p:nvSpPr>
+        <p:spPr>
+          <a:xfrm>
+            <a:off x="3502284" y="239841"/>
+            <a:ext cx="786047" cy="523702"/>
+          </a:xfrm>
+          <a:prstGeom prst="roundRect">
+            <a:avLst/>
+          </a:prstGeom>
+          <a:solidFill>
+            <a:srgbClr val="00B050"/>
+          </a:solidFill>
+        </p:spPr>
+        <p:style>
+          <a:lnRef idx="2">
+            <a:schemeClr val="accent1">
+              <a:shade val="50000"/>
+            </a:schemeClr>
+          </a:lnRef>
+          <a:fillRef idx="1">
+            <a:schemeClr val="accent1"/>
+          </a:fillRef>
+          <a:effectRef idx="0">
+            <a:schemeClr val="accent1"/>
+          </a:effectRef>
+          <a:fontRef idx="minor">
+            <a:schemeClr val="lt1"/>
+          </a:fontRef>
+        </p:style>
+        <p:txBody>
+          <a:bodyPr rtlCol="0" anchor="ctr"/>
+          <a:lstStyle/>
+          <a:p>
+            <a:pPr algn="ctr"/>
+            <a:r>
+              <a:rPr lang="de-DE" dirty="0" smtClean="0"/>
+              <a:t>TOC</a:t>
+            </a:r>
+            <a:endParaRPr lang="de-DE" dirty="0" smtClean="0"/>
+          </a:p>
+        </p:txBody>
+      </p:sp>
+      <p:sp>
+        <p:nvSpPr>
+          <p:cNvPr id="33" name="Abgerundetes Rechteck 32"/>
+          <p:cNvSpPr/>
+          <p:nvPr/>
+        </p:nvSpPr>
+        <p:spPr>
+          <a:xfrm>
+            <a:off x="2189909" y="1914386"/>
+            <a:ext cx="2144684" cy="477352"/>
+          </a:xfrm>
+          <a:prstGeom prst="roundRect">
+            <a:avLst/>
+          </a:prstGeom>
+          <a:solidFill>
+            <a:srgbClr val="FFC000"/>
+          </a:solidFill>
+        </p:spPr>
+        <p:style>
+          <a:lnRef idx="2">
+            <a:schemeClr val="accent1">
+              <a:shade val="50000"/>
+            </a:schemeClr>
+          </a:lnRef>
+          <a:fillRef idx="1">
+            <a:schemeClr val="accent1"/>
+          </a:fillRef>
+          <a:effectRef idx="0">
+            <a:schemeClr val="accent1"/>
+          </a:effectRef>
+          <a:fontRef idx="minor">
+            <a:schemeClr val="lt1"/>
+          </a:fontRef>
+        </p:style>
+        <p:txBody>
+          <a:bodyPr rtlCol="0" anchor="ctr"/>
+          <a:lstStyle/>
+          <a:p>
+            <a:pPr algn="ctr"/>
+            <a:r>
+              <a:rPr lang="de-DE" dirty="0" smtClean="0">
+                <a:solidFill>
+                  <a:schemeClr val="tx1"/>
+                </a:solidFill>
+              </a:rPr>
+              <a:t>Wie </a:t>
+            </a:r>
+            <a:r>
+              <a:rPr lang="de-DE" dirty="0" err="1" smtClean="0">
+                <a:solidFill>
+                  <a:schemeClr val="tx1"/>
+                </a:solidFill>
+              </a:rPr>
+              <a:t>webserver</a:t>
+            </a:r>
+            <a:r>
+              <a:rPr lang="de-DE" dirty="0" smtClean="0">
+                <a:solidFill>
+                  <a:schemeClr val="tx1"/>
+                </a:solidFill>
+              </a:rPr>
+              <a:t> benutzen</a:t>
+            </a:r>
+            <a:endParaRPr lang="de-DE" dirty="0">
+              <a:solidFill>
+                <a:schemeClr val="tx1"/>
+              </a:solidFill>
+            </a:endParaRPr>
+          </a:p>
+        </p:txBody>
+      </p:sp>
+      <p:sp>
+        <p:nvSpPr>
+          <p:cNvPr id="34" name="Abgerundetes Rechteck 33"/>
+          <p:cNvSpPr/>
+          <p:nvPr/>
+        </p:nvSpPr>
+        <p:spPr>
+          <a:xfrm>
+            <a:off x="7609527" y="2748988"/>
+            <a:ext cx="1584550" cy="1263469"/>
+          </a:xfrm>
+          <a:prstGeom prst="roundRect">
+            <a:avLst/>
+          </a:prstGeom>
+          <a:solidFill>
+            <a:schemeClr val="accent5"/>
+          </a:solidFill>
+        </p:spPr>
+        <p:style>
+          <a:lnRef idx="2">
+            <a:schemeClr val="accent1">
+              <a:shade val="50000"/>
+            </a:schemeClr>
+          </a:lnRef>
+          <a:fillRef idx="1">
+            <a:schemeClr val="accent1"/>
+          </a:fillRef>
+          <a:effectRef idx="0">
+            <a:schemeClr val="accent1"/>
+          </a:effectRef>
+          <a:fontRef idx="minor">
+            <a:schemeClr val="lt1"/>
+          </a:fontRef>
+        </p:style>
+        <p:txBody>
+          <a:bodyPr rtlCol="0" anchor="ctr"/>
+          <a:lstStyle/>
+          <a:p>
+            <a:r>
+              <a:rPr lang="de-DE" dirty="0" smtClean="0"/>
+              <a:t>Run </a:t>
+            </a:r>
+            <a:r>
+              <a:rPr lang="de-DE" dirty="0" err="1" smtClean="0"/>
+              <a:t>locally</a:t>
+            </a:r>
+            <a:endParaRPr lang="de-DE" dirty="0" smtClean="0"/>
+          </a:p>
+          <a:p>
+            <a:pPr marL="285750" indent="-285750">
+              <a:buFont typeface="Arial" panose="020B0604020202020204" pitchFamily="34" charset="0"/>
+              <a:buChar char="•"/>
+            </a:pPr>
+            <a:r>
+              <a:rPr lang="de-DE" dirty="0" smtClean="0">
+                <a:solidFill>
+                  <a:srgbClr val="00B050"/>
+                </a:solidFill>
+              </a:rPr>
+              <a:t>Run </a:t>
+            </a:r>
+            <a:r>
+              <a:rPr lang="de-DE" dirty="0" err="1" smtClean="0"/>
+              <a:t>existing</a:t>
+            </a:r>
+            <a:endParaRPr lang="de-DE" dirty="0" smtClean="0"/>
+          </a:p>
+          <a:p>
+            <a:pPr marL="285750" indent="-285750">
+              <a:buFont typeface="Arial" panose="020B0604020202020204" pitchFamily="34" charset="0"/>
+              <a:buChar char="•"/>
+            </a:pPr>
+            <a:r>
+              <a:rPr lang="de-DE" dirty="0" smtClean="0"/>
+              <a:t>Edit</a:t>
+            </a:r>
+          </a:p>
+          <a:p>
+            <a:pPr marL="285750" indent="-285750">
+              <a:buFont typeface="Arial" panose="020B0604020202020204" pitchFamily="34" charset="0"/>
+              <a:buChar char="•"/>
+            </a:pPr>
+            <a:r>
+              <a:rPr lang="de-DE" dirty="0" err="1" smtClean="0"/>
+              <a:t>copy</a:t>
+            </a:r>
+            <a:endParaRPr lang="de-DE" dirty="0" smtClean="0"/>
+          </a:p>
+        </p:txBody>
+      </p:sp>
+      <p:cxnSp>
+        <p:nvCxnSpPr>
+          <p:cNvPr id="36" name="Gerader Verbinder 35"/>
+          <p:cNvCxnSpPr/>
+          <p:nvPr/>
+        </p:nvCxnSpPr>
+        <p:spPr>
+          <a:xfrm flipV="1">
+            <a:off x="73386" y="822366"/>
+            <a:ext cx="11838752" cy="17219"/>
+          </a:xfrm>
+          <a:prstGeom prst="line">
+            <a:avLst/>
+          </a:prstGeom>
+        </p:spPr>
+        <p:style>
+          <a:lnRef idx="1">
+            <a:schemeClr val="accent1"/>
+          </a:lnRef>
+          <a:fillRef idx="0">
+            <a:schemeClr val="accent1"/>
+          </a:fillRef>
+          <a:effectRef idx="0">
+            <a:schemeClr val="accent1"/>
+          </a:effectRef>
+          <a:fontRef idx="minor">
+            <a:schemeClr val="tx1"/>
+          </a:fontRef>
+        </p:style>
+      </p:cxnSp>
+      <p:cxnSp>
+        <p:nvCxnSpPr>
+          <p:cNvPr id="38" name="Gerader Verbinder 37"/>
+          <p:cNvCxnSpPr/>
+          <p:nvPr/>
+        </p:nvCxnSpPr>
+        <p:spPr>
+          <a:xfrm flipV="1">
+            <a:off x="73386" y="1681676"/>
+            <a:ext cx="11838752" cy="17219"/>
+          </a:xfrm>
+          <a:prstGeom prst="line">
+            <a:avLst/>
+          </a:prstGeom>
+        </p:spPr>
+        <p:style>
+          <a:lnRef idx="1">
+            <a:schemeClr val="accent1"/>
+          </a:lnRef>
+          <a:fillRef idx="0">
+            <a:schemeClr val="accent1"/>
+          </a:fillRef>
+          <a:effectRef idx="0">
+            <a:schemeClr val="accent1"/>
+          </a:effectRef>
+          <a:fontRef idx="minor">
+            <a:schemeClr val="tx1"/>
+          </a:fontRef>
+        </p:style>
+      </p:cxnSp>
+      <p:cxnSp>
+        <p:nvCxnSpPr>
+          <p:cNvPr id="39" name="Gerader Verbinder 38"/>
+          <p:cNvCxnSpPr/>
+          <p:nvPr/>
+        </p:nvCxnSpPr>
+        <p:spPr>
+          <a:xfrm flipV="1">
+            <a:off x="141918" y="2550793"/>
+            <a:ext cx="11838752" cy="17219"/>
+          </a:xfrm>
+          <a:prstGeom prst="line">
+            <a:avLst/>
+          </a:prstGeom>
+        </p:spPr>
+        <p:style>
+          <a:lnRef idx="1">
+            <a:schemeClr val="accent1"/>
+          </a:lnRef>
+          <a:fillRef idx="0">
+            <a:schemeClr val="accent1"/>
+          </a:fillRef>
+          <a:effectRef idx="0">
+            <a:schemeClr val="accent1"/>
+          </a:effectRef>
+          <a:fontRef idx="minor">
+            <a:schemeClr val="tx1"/>
+          </a:fontRef>
+        </p:style>
+      </p:cxnSp>
+      <p:cxnSp>
+        <p:nvCxnSpPr>
+          <p:cNvPr id="40" name="Gerader Verbinder 39"/>
+          <p:cNvCxnSpPr/>
+          <p:nvPr/>
+        </p:nvCxnSpPr>
+        <p:spPr>
+          <a:xfrm flipV="1">
+            <a:off x="73386" y="4631313"/>
+            <a:ext cx="11838752" cy="17219"/>
+          </a:xfrm>
+          <a:prstGeom prst="line">
+            <a:avLst/>
+          </a:prstGeom>
+        </p:spPr>
+        <p:style>
+          <a:lnRef idx="1">
+            <a:schemeClr val="accent1"/>
+          </a:lnRef>
+          <a:fillRef idx="0">
+            <a:schemeClr val="accent1"/>
+          </a:fillRef>
+          <a:effectRef idx="0">
+            <a:schemeClr val="accent1"/>
+          </a:effectRef>
+          <a:fontRef idx="minor">
+            <a:schemeClr val="tx1"/>
+          </a:fontRef>
+        </p:style>
+      </p:cxnSp>
+      <p:sp>
+        <p:nvSpPr>
+          <p:cNvPr id="41" name="Abgerundetes Rechteck 40"/>
+          <p:cNvSpPr/>
+          <p:nvPr/>
+        </p:nvSpPr>
+        <p:spPr>
+          <a:xfrm>
+            <a:off x="4349085" y="248984"/>
+            <a:ext cx="786047" cy="523702"/>
+          </a:xfrm>
+          <a:prstGeom prst="roundRect">
+            <a:avLst/>
+          </a:prstGeom>
+          <a:solidFill>
+            <a:srgbClr val="00B050"/>
+          </a:solidFill>
+        </p:spPr>
+        <p:style>
+          <a:lnRef idx="2">
+            <a:schemeClr val="accent1">
+              <a:shade val="50000"/>
+            </a:schemeClr>
+          </a:lnRef>
+          <a:fillRef idx="1">
+            <a:schemeClr val="accent1"/>
+          </a:fillRef>
+          <a:effectRef idx="0">
+            <a:schemeClr val="accent1"/>
+          </a:effectRef>
+          <a:fontRef idx="minor">
+            <a:schemeClr val="lt1"/>
+          </a:fontRef>
+        </p:style>
+        <p:txBody>
+          <a:bodyPr rtlCol="0" anchor="ctr"/>
+          <a:lstStyle/>
+          <a:p>
+            <a:pPr algn="ctr"/>
+            <a:r>
+              <a:rPr lang="de-DE" dirty="0" smtClean="0"/>
+              <a:t>Links</a:t>
+            </a:r>
+            <a:endParaRPr lang="de-DE" dirty="0" smtClean="0"/>
+          </a:p>
+        </p:txBody>
+      </p:sp>
+      <p:sp>
+        <p:nvSpPr>
+          <p:cNvPr id="42" name="Abgerundetes Rechteck 41"/>
+          <p:cNvSpPr/>
+          <p:nvPr/>
+        </p:nvSpPr>
+        <p:spPr>
+          <a:xfrm>
+            <a:off x="2483450" y="247021"/>
+            <a:ext cx="786047" cy="523702"/>
+          </a:xfrm>
+          <a:prstGeom prst="roundRect">
+            <a:avLst/>
+          </a:prstGeom>
+          <a:solidFill>
+            <a:schemeClr val="accent5"/>
+          </a:solidFill>
+        </p:spPr>
+        <p:style>
+          <a:lnRef idx="2">
+            <a:schemeClr val="accent1">
+              <a:shade val="50000"/>
+            </a:schemeClr>
+          </a:lnRef>
+          <a:fillRef idx="1">
+            <a:schemeClr val="accent1"/>
+          </a:fillRef>
+          <a:effectRef idx="0">
+            <a:schemeClr val="accent1"/>
+          </a:effectRef>
+          <a:fontRef idx="minor">
+            <a:schemeClr val="lt1"/>
+          </a:fontRef>
+        </p:style>
+        <p:txBody>
+          <a:bodyPr rtlCol="0" anchor="ctr"/>
+          <a:lstStyle/>
+          <a:p>
+            <a:pPr algn="ctr"/>
+            <a:r>
+              <a:rPr lang="de-DE" dirty="0" smtClean="0"/>
+              <a:t>Intro</a:t>
+            </a:r>
+            <a:endParaRPr lang="de-DE" dirty="0" smtClean="0"/>
+          </a:p>
+        </p:txBody>
+      </p:sp>
+      <p:sp>
+        <p:nvSpPr>
+          <p:cNvPr id="43" name="Abgerundetes Rechteck 42"/>
+          <p:cNvSpPr/>
+          <p:nvPr/>
+        </p:nvSpPr>
+        <p:spPr>
+          <a:xfrm>
+            <a:off x="2104167" y="5297443"/>
+            <a:ext cx="1955948" cy="531562"/>
+          </a:xfrm>
+          <a:prstGeom prst="roundRect">
+            <a:avLst/>
+          </a:prstGeom>
+          <a:solidFill>
+            <a:schemeClr val="accent5"/>
+          </a:solidFill>
+        </p:spPr>
+        <p:style>
+          <a:lnRef idx="2">
+            <a:schemeClr val="accent1">
+              <a:shade val="50000"/>
+            </a:schemeClr>
+          </a:lnRef>
+          <a:fillRef idx="1">
+            <a:schemeClr val="accent1"/>
+          </a:fillRef>
+          <a:effectRef idx="0">
+            <a:schemeClr val="accent1"/>
+          </a:effectRef>
+          <a:fontRef idx="minor">
+            <a:schemeClr val="lt1"/>
+          </a:fontRef>
+        </p:style>
+        <p:txBody>
+          <a:bodyPr rtlCol="0" anchor="ctr"/>
+          <a:lstStyle/>
+          <a:p>
+            <a:pPr algn="ctr"/>
+            <a:r>
+              <a:rPr lang="de-DE" dirty="0" err="1" smtClean="0"/>
+              <a:t>Contributing</a:t>
+            </a:r>
+            <a:r>
+              <a:rPr lang="de-DE" dirty="0" smtClean="0"/>
+              <a:t> </a:t>
+            </a:r>
+            <a:r>
+              <a:rPr lang="de-DE" dirty="0" err="1" smtClean="0"/>
+              <a:t>framework</a:t>
+            </a:r>
+            <a:endParaRPr lang="de-DE" dirty="0" smtClean="0"/>
+          </a:p>
+        </p:txBody>
+      </p:sp>
+      <p:sp>
+        <p:nvSpPr>
+          <p:cNvPr id="44" name="Abgerundetes Rechteck 43"/>
+          <p:cNvSpPr/>
+          <p:nvPr/>
+        </p:nvSpPr>
+        <p:spPr>
+          <a:xfrm>
+            <a:off x="4242899" y="5928518"/>
+            <a:ext cx="1784465" cy="523702"/>
+          </a:xfrm>
+          <a:prstGeom prst="roundRect">
+            <a:avLst/>
+          </a:prstGeom>
+          <a:solidFill>
+            <a:srgbClr val="00B050"/>
+          </a:solidFill>
+        </p:spPr>
+        <p:style>
+          <a:lnRef idx="2">
+            <a:schemeClr val="accent1">
+              <a:shade val="50000"/>
+            </a:schemeClr>
+          </a:lnRef>
+          <a:fillRef idx="1">
+            <a:schemeClr val="accent1"/>
+          </a:fillRef>
+          <a:effectRef idx="0">
+            <a:schemeClr val="accent1"/>
+          </a:effectRef>
+          <a:fontRef idx="minor">
+            <a:schemeClr val="lt1"/>
+          </a:fontRef>
+        </p:style>
+        <p:txBody>
+          <a:bodyPr rtlCol="0" anchor="ctr"/>
+          <a:lstStyle/>
+          <a:p>
+            <a:pPr algn="ctr"/>
+            <a:r>
+              <a:rPr lang="de-DE" dirty="0" smtClean="0"/>
+              <a:t>Project </a:t>
+            </a:r>
+            <a:r>
+              <a:rPr lang="de-DE" dirty="0" err="1" smtClean="0"/>
+              <a:t>Structure</a:t>
+            </a:r>
+            <a:endParaRPr lang="de-DE" dirty="0"/>
+          </a:p>
+        </p:txBody>
+      </p:sp>
+    </p:spTree>
+    <p:extLst>
+      <p:ext uri="{BB962C8B-B14F-4D97-AF65-F5344CB8AC3E}">
+        <p14:creationId xmlns:p14="http://schemas.microsoft.com/office/powerpoint/2010/main" val="2475171251"/>
+      </p:ext>
+    </p:extLst>
+  </p:cSld>
+  <p:clrMapOvr>
+    <a:masterClrMapping/>
+  </p:clrMapOvr>
+  <p:timing>
+    <p:tnLst>
+      <p:par>
+        <p:cTn id="1" dur="indefinite" restart="never" nodeType="tmRoot"/>
+      </p:par>
+    </p:tnLst>
+  </p:timing>
+</p:sld>
+</file>
+
+<file path=ppt/slides/slide5.xml><?xml version="1.0" encoding="utf-8"?>
+<p:sld xmlns:a="http://schemas.openxmlformats.org/drawingml/2006/main" xmlns:r="http://schemas.openxmlformats.org/officeDocument/2006/relationships" xmlns:p="http://schemas.openxmlformats.org/presentationml/2006/main">
+  <p:cSld>
+    <p:spTree>
+      <p:nvGrpSpPr>
+        <p:cNvPr id="1" name=""/>
+        <p:cNvGrpSpPr/>
+        <p:nvPr/>
+      </p:nvGrpSpPr>
+      <p:grpSpPr>
+        <a:xfrm>
+          <a:off x="0" y="0"/>
+          <a:ext cx="0" cy="0"/>
+          <a:chOff x="0" y="0"/>
+          <a:chExt cx="0" cy="0"/>
+        </a:xfrm>
+      </p:grpSpPr>
+      <p:sp>
+        <p:nvSpPr>
           <p:cNvPr id="2" name="Titel 1"/>
           <p:cNvSpPr>
             <a:spLocks noGrp="1"/>
@@ -5701,19 +7380,54 @@
             </a:pPr>
             <a:r>
               <a:rPr lang="de-DE" dirty="0" smtClean="0"/>
-              <a:t>Dokumentationssoftware nutzen</a:t>
-            </a:r>
+              <a:t>CI erwähnen</a:t>
+            </a:r>
+          </a:p>
+          <a:p>
+            <a:pPr marL="285750" indent="-285750">
+              <a:buFont typeface="Arial" panose="020B0604020202020204" pitchFamily="34" charset="0"/>
+              <a:buChar char="•"/>
+            </a:pPr>
             <a:r>
               <a:rPr lang="de-DE" dirty="0" smtClean="0"/>
-              <a:t>? (</a:t>
+              <a:t>Verlinkungen einbauen</a:t>
+            </a:r>
+          </a:p>
+          <a:p>
+            <a:pPr marL="681692" lvl="1" indent="-285750">
+              <a:buFont typeface="Arial" panose="020B0604020202020204" pitchFamily="34" charset="0"/>
+              <a:buChar char="•"/>
+            </a:pPr>
+            <a:r>
+              <a:rPr lang="de-DE" dirty="0" smtClean="0"/>
+              <a:t>Links für </a:t>
             </a:r>
             <a:r>
               <a:rPr lang="de-DE" dirty="0" err="1" smtClean="0"/>
-              <a:t>ReadTheDocs</a:t>
-            </a:r>
-            <a:r>
-              <a:rPr lang="de-DE" smtClean="0"/>
-              <a:t>?)</a:t>
+              <a:t>keywords</a:t>
+            </a:r>
+            <a:endParaRPr lang="de-DE" dirty="0" smtClean="0"/>
+          </a:p>
+          <a:p>
+            <a:pPr marL="681692" lvl="1" indent="-285750">
+              <a:buFont typeface="Arial" panose="020B0604020202020204" pitchFamily="34" charset="0"/>
+              <a:buChar char="•"/>
+            </a:pPr>
+            <a:r>
+              <a:rPr lang="de-DE" dirty="0" err="1" smtClean="0"/>
+              <a:t>Nextpage</a:t>
+            </a:r>
+            <a:r>
+              <a:rPr lang="de-DE" dirty="0" smtClean="0"/>
+              <a:t> -&gt; sinnvolle </a:t>
+            </a:r>
+            <a:r>
+              <a:rPr lang="de-DE" dirty="0" err="1" smtClean="0"/>
+              <a:t>reihenfolge</a:t>
+            </a:r>
+            <a:r>
+              <a:rPr lang="de-DE" dirty="0" smtClean="0"/>
+              <a:t> zum lesen vorgeben</a:t>
             </a:r>
             <a:endParaRPr lang="de-DE" dirty="0" smtClean="0"/>
           </a:p>

</xml_diff>